<commit_message>
overhauled client code to use hottowel template
</commit_message>
<xml_diff>
--- a/Slides/M5 Client.pptx
+++ b/Slides/M5 Client.pptx
@@ -6,10 +6,10 @@
     <p:sldMasterId id="2147483674" r:id="rId5"/>
   </p:sldMasterIdLst>
   <p:notesMasterIdLst>
-    <p:notesMasterId r:id="rId14"/>
+    <p:notesMasterId r:id="rId19"/>
   </p:notesMasterIdLst>
   <p:handoutMasterIdLst>
-    <p:handoutMasterId r:id="rId15"/>
+    <p:handoutMasterId r:id="rId20"/>
   </p:handoutMasterIdLst>
   <p:sldIdLst>
     <p:sldId id="271" r:id="rId6"/>
@@ -17,9 +17,14 @@
     <p:sldId id="283" r:id="rId8"/>
     <p:sldId id="288" r:id="rId9"/>
     <p:sldId id="414" r:id="rId10"/>
-    <p:sldId id="454" r:id="rId11"/>
-    <p:sldId id="458" r:id="rId12"/>
-    <p:sldId id="269" r:id="rId13"/>
+    <p:sldId id="460" r:id="rId11"/>
+    <p:sldId id="461" r:id="rId12"/>
+    <p:sldId id="462" r:id="rId13"/>
+    <p:sldId id="463" r:id="rId14"/>
+    <p:sldId id="464" r:id="rId15"/>
+    <p:sldId id="454" r:id="rId16"/>
+    <p:sldId id="458" r:id="rId17"/>
+    <p:sldId id="269" r:id="rId18"/>
   </p:sldIdLst>
   <p:sldSz cx="12192000" cy="6858000"/>
   <p:notesSz cx="6858000" cy="9144000"/>
@@ -132,6 +137,11 @@
             <p14:sldId id="283"/>
             <p14:sldId id="288"/>
             <p14:sldId id="414"/>
+            <p14:sldId id="460"/>
+            <p14:sldId id="461"/>
+            <p14:sldId id="462"/>
+            <p14:sldId id="463"/>
+            <p14:sldId id="464"/>
             <p14:sldId id="454"/>
             <p14:sldId id="458"/>
           </p14:sldIdLst>
@@ -235,7 +245,7 @@
           <a:p>
             <a:fld id="{312E7B4A-039C-48A2-9B2C-AF16AA3873D8}" type="datetimeFigureOut">
               <a:rPr lang="en-US" smtClean="0"/>
-              <a:t>10/13/2014</a:t>
+              <a:t>10/14/2014</a:t>
             </a:fld>
             <a:endParaRPr lang="en-US"/>
           </a:p>
@@ -400,7 +410,7 @@
           <a:p>
             <a:fld id="{DA005A0C-54D9-45AA-87D4-C551D08DFCE1}" type="datetimeFigureOut">
               <a:rPr lang="en-US" smtClean="0"/>
-              <a:t>10/13/2014</a:t>
+              <a:t>10/14/2014</a:t>
             </a:fld>
             <a:endParaRPr lang="en-US"/>
           </a:p>
@@ -1102,7 +1112,7 @@
             <a:fld id="{13F0F35F-DD44-4607-AEC1-49D7A4BC4066}" type="slidenum">
               <a:rPr lang="en-US" smtClean="0"/>
               <a:pPr/>
-              <a:t>6</a:t>
+              <a:t>11</a:t>
             </a:fld>
             <a:endParaRPr lang="en-US" dirty="0"/>
           </a:p>
@@ -1194,7 +1204,7 @@
             <a:fld id="{13F0F35F-DD44-4607-AEC1-49D7A4BC4066}" type="slidenum">
               <a:rPr lang="en-US" smtClean="0"/>
               <a:pPr/>
-              <a:t>7</a:t>
+              <a:t>12</a:t>
             </a:fld>
             <a:endParaRPr lang="en-US" dirty="0"/>
           </a:p>
@@ -6718,6 +6728,263 @@
 </p:sld>
 </file>
 
+<file path=ppt/slides/slide10.xml><?xml version="1.0" encoding="utf-8"?>
+<p:sld xmlns:a="http://schemas.openxmlformats.org/drawingml/2006/main" xmlns:r="http://schemas.openxmlformats.org/officeDocument/2006/relationships" xmlns:p="http://schemas.openxmlformats.org/presentationml/2006/main">
+  <p:cSld>
+    <p:spTree>
+      <p:nvGrpSpPr>
+        <p:cNvPr id="1" name=""/>
+        <p:cNvGrpSpPr/>
+        <p:nvPr/>
+      </p:nvGrpSpPr>
+      <p:grpSpPr>
+        <a:xfrm>
+          <a:off x="0" y="0"/>
+          <a:ext cx="0" cy="0"/>
+          <a:chOff x="0" y="0"/>
+          <a:chExt cx="0" cy="0"/>
+        </a:xfrm>
+      </p:grpSpPr>
+      <p:sp>
+        <p:nvSpPr>
+          <p:cNvPr id="4" name="Title 3"/>
+          <p:cNvSpPr>
+            <a:spLocks noGrp="1"/>
+          </p:cNvSpPr>
+          <p:nvPr>
+            <p:ph type="title"/>
+          </p:nvPr>
+        </p:nvSpPr>
+        <p:spPr/>
+        <p:txBody>
+          <a:bodyPr/>
+          <a:lstStyle/>
+          <a:p>
+            <a:r>
+              <a:rPr lang="en-US" dirty="0" smtClean="0"/>
+              <a:t>Starting with </a:t>
+            </a:r>
+            <a:r>
+              <a:rPr lang="en-US" dirty="0" err="1" smtClean="0"/>
+              <a:t>HotTowel</a:t>
+            </a:r>
+            <a:r>
+              <a:rPr lang="en-US" dirty="0" smtClean="0"/>
+              <a:t> by John Papa via </a:t>
+            </a:r>
+            <a:r>
+              <a:rPr lang="en-US" dirty="0" err="1" smtClean="0"/>
+              <a:t>Nuget</a:t>
+            </a:r>
+            <a:endParaRPr lang="en-US" dirty="0"/>
+          </a:p>
+        </p:txBody>
+      </p:sp>
+    </p:spTree>
+    <p:extLst>
+      <p:ext uri="{BB962C8B-B14F-4D97-AF65-F5344CB8AC3E}">
+        <p14:creationId xmlns:p14="http://schemas.microsoft.com/office/powerpoint/2010/main" val="254078508"/>
+      </p:ext>
+    </p:extLst>
+  </p:cSld>
+  <p:clrMapOvr>
+    <a:masterClrMapping/>
+  </p:clrMapOvr>
+</p:sld>
+</file>
+
+<file path=ppt/slides/slide11.xml><?xml version="1.0" encoding="utf-8"?>
+<p:sld xmlns:a="http://schemas.openxmlformats.org/drawingml/2006/main" xmlns:r="http://schemas.openxmlformats.org/officeDocument/2006/relationships" xmlns:p="http://schemas.openxmlformats.org/presentationml/2006/main">
+  <p:cSld>
+    <p:spTree>
+      <p:nvGrpSpPr>
+        <p:cNvPr id="1" name=""/>
+        <p:cNvGrpSpPr/>
+        <p:nvPr/>
+      </p:nvGrpSpPr>
+      <p:grpSpPr>
+        <a:xfrm>
+          <a:off x="0" y="0"/>
+          <a:ext cx="0" cy="0"/>
+          <a:chOff x="0" y="0"/>
+          <a:chExt cx="0" cy="0"/>
+        </a:xfrm>
+      </p:grpSpPr>
+      <p:sp>
+        <p:nvSpPr>
+          <p:cNvPr id="7" name="Content Placeholder 6"/>
+          <p:cNvSpPr>
+            <a:spLocks noGrp="1"/>
+          </p:cNvSpPr>
+          <p:nvPr>
+            <p:ph sz="quarter" idx="10"/>
+          </p:nvPr>
+        </p:nvSpPr>
+        <p:spPr/>
+        <p:txBody>
+          <a:bodyPr>
+            <a:normAutofit/>
+          </a:bodyPr>
+          <a:lstStyle/>
+          <a:p>
+            <a:endParaRPr lang="en-GB" dirty="0"/>
+          </a:p>
+        </p:txBody>
+      </p:sp>
+      <p:sp>
+        <p:nvSpPr>
+          <p:cNvPr id="2" name="Title 1"/>
+          <p:cNvSpPr>
+            <a:spLocks noGrp="1"/>
+          </p:cNvSpPr>
+          <p:nvPr>
+            <p:ph type="title"/>
+          </p:nvPr>
+        </p:nvSpPr>
+        <p:spPr/>
+        <p:txBody>
+          <a:bodyPr/>
+          <a:lstStyle/>
+          <a:p>
+            <a:r>
+              <a:rPr lang="en-US" dirty="0" smtClean="0"/>
+              <a:t>Resources</a:t>
+            </a:r>
+            <a:endParaRPr lang="en-US" dirty="0"/>
+          </a:p>
+        </p:txBody>
+      </p:sp>
+    </p:spTree>
+    <p:extLst>
+      <p:ext uri="{BB962C8B-B14F-4D97-AF65-F5344CB8AC3E}">
+        <p14:creationId xmlns:p14="http://schemas.microsoft.com/office/powerpoint/2010/main" val="2567384094"/>
+      </p:ext>
+    </p:extLst>
+  </p:cSld>
+  <p:clrMapOvr>
+    <a:masterClrMapping/>
+  </p:clrMapOvr>
+  <p:timing>
+    <p:tnLst>
+      <p:par>
+        <p:cTn id="1" dur="indefinite" restart="never" nodeType="tmRoot"/>
+      </p:par>
+    </p:tnLst>
+  </p:timing>
+</p:sld>
+</file>
+
+<file path=ppt/slides/slide12.xml><?xml version="1.0" encoding="utf-8"?>
+<p:sld xmlns:a="http://schemas.openxmlformats.org/drawingml/2006/main" xmlns:r="http://schemas.openxmlformats.org/officeDocument/2006/relationships" xmlns:p="http://schemas.openxmlformats.org/presentationml/2006/main">
+  <p:cSld>
+    <p:spTree>
+      <p:nvGrpSpPr>
+        <p:cNvPr id="1" name=""/>
+        <p:cNvGrpSpPr/>
+        <p:nvPr/>
+      </p:nvGrpSpPr>
+      <p:grpSpPr>
+        <a:xfrm>
+          <a:off x="0" y="0"/>
+          <a:ext cx="0" cy="0"/>
+          <a:chOff x="0" y="0"/>
+          <a:chExt cx="0" cy="0"/>
+        </a:xfrm>
+      </p:grpSpPr>
+      <p:sp>
+        <p:nvSpPr>
+          <p:cNvPr id="7" name="Content Placeholder 6"/>
+          <p:cNvSpPr>
+            <a:spLocks noGrp="1"/>
+          </p:cNvSpPr>
+          <p:nvPr>
+            <p:ph sz="quarter" idx="10"/>
+          </p:nvPr>
+        </p:nvSpPr>
+        <p:spPr/>
+        <p:txBody>
+          <a:bodyPr>
+            <a:normAutofit/>
+          </a:bodyPr>
+          <a:lstStyle/>
+          <a:p>
+            <a:endParaRPr lang="en-GB" dirty="0"/>
+          </a:p>
+        </p:txBody>
+      </p:sp>
+      <p:sp>
+        <p:nvSpPr>
+          <p:cNvPr id="2" name="Title 1"/>
+          <p:cNvSpPr>
+            <a:spLocks noGrp="1"/>
+          </p:cNvSpPr>
+          <p:nvPr>
+            <p:ph type="title"/>
+          </p:nvPr>
+        </p:nvSpPr>
+        <p:spPr/>
+        <p:txBody>
+          <a:bodyPr/>
+          <a:lstStyle/>
+          <a:p>
+            <a:r>
+              <a:rPr lang="en-US" dirty="0" smtClean="0"/>
+              <a:t>Summary</a:t>
+            </a:r>
+            <a:endParaRPr lang="en-US" dirty="0"/>
+          </a:p>
+        </p:txBody>
+      </p:sp>
+    </p:spTree>
+    <p:extLst>
+      <p:ext uri="{BB962C8B-B14F-4D97-AF65-F5344CB8AC3E}">
+        <p14:creationId xmlns:p14="http://schemas.microsoft.com/office/powerpoint/2010/main" val="393125443"/>
+      </p:ext>
+    </p:extLst>
+  </p:cSld>
+  <p:clrMapOvr>
+    <a:masterClrMapping/>
+  </p:clrMapOvr>
+  <p:timing>
+    <p:tnLst>
+      <p:par>
+        <p:cTn id="1" dur="indefinite" restart="never" nodeType="tmRoot"/>
+      </p:par>
+    </p:tnLst>
+  </p:timing>
+</p:sld>
+</file>
+
+<file path=ppt/slides/slide13.xml><?xml version="1.0" encoding="utf-8"?>
+<p:sld xmlns:a="http://schemas.openxmlformats.org/drawingml/2006/main" xmlns:r="http://schemas.openxmlformats.org/officeDocument/2006/relationships" xmlns:p="http://schemas.openxmlformats.org/presentationml/2006/main">
+  <p:cSld>
+    <p:spTree>
+      <p:nvGrpSpPr>
+        <p:cNvPr id="1" name=""/>
+        <p:cNvGrpSpPr/>
+        <p:nvPr/>
+      </p:nvGrpSpPr>
+      <p:grpSpPr>
+        <a:xfrm>
+          <a:off x="0" y="0"/>
+          <a:ext cx="0" cy="0"/>
+          <a:chOff x="0" y="0"/>
+          <a:chExt cx="0" cy="0"/>
+        </a:xfrm>
+      </p:grpSpPr>
+    </p:spTree>
+    <p:extLst>
+      <p:ext uri="{BB962C8B-B14F-4D97-AF65-F5344CB8AC3E}">
+        <p14:creationId xmlns:p14="http://schemas.microsoft.com/office/powerpoint/2010/main" val="898363405"/>
+      </p:ext>
+    </p:extLst>
+  </p:cSld>
+  <p:clrMapOvr>
+    <a:masterClrMapping/>
+  </p:clrMapOvr>
+</p:sld>
+</file>
+
 <file path=ppt/slides/slide2.xml><?xml version="1.0" encoding="utf-8"?>
 <p:sld xmlns:a="http://schemas.openxmlformats.org/drawingml/2006/main" xmlns:r="http://schemas.openxmlformats.org/officeDocument/2006/relationships" xmlns:p="http://schemas.openxmlformats.org/presentationml/2006/main">
   <p:cSld>
@@ -6786,14 +7053,14 @@
                 <a:gridCol w="5762625">
                   <a:extLst>
                     <a:ext uri="{9D8B030D-6E8A-4147-A177-3AD203B41FA5}">
-                      <a16:colId xmlns:a16="http://schemas.microsoft.com/office/drawing/2014/main" xmlns="" val="1632794655"/>
+                      <a16:colId xmlns="" xmlns:a16="http://schemas.microsoft.com/office/drawing/2014/main" val="1632794655"/>
                     </a:ext>
                   </a:extLst>
                 </a:gridCol>
                 <a:gridCol w="5762625">
                   <a:extLst>
                     <a:ext uri="{9D8B030D-6E8A-4147-A177-3AD203B41FA5}">
-                      <a16:colId xmlns:a16="http://schemas.microsoft.com/office/drawing/2014/main" xmlns="" val="2011313899"/>
+                      <a16:colId xmlns="" xmlns:a16="http://schemas.microsoft.com/office/drawing/2014/main" val="2011313899"/>
                     </a:ext>
                   </a:extLst>
                 </a:gridCol>
@@ -6831,7 +7098,7 @@
                 </a:tc>
                 <a:extLst>
                   <a:ext uri="{0D108BD9-81ED-4DB2-BD59-A6C34878D82A}">
-                    <a16:rowId xmlns:a16="http://schemas.microsoft.com/office/drawing/2014/main" xmlns="" val="1789177411"/>
+                    <a16:rowId xmlns="" xmlns:a16="http://schemas.microsoft.com/office/drawing/2014/main" val="1789177411"/>
                   </a:ext>
                 </a:extLst>
               </a:tr>
@@ -6892,7 +7159,7 @@
                 </a:tc>
                 <a:extLst>
                   <a:ext uri="{0D108BD9-81ED-4DB2-BD59-A6C34878D82A}">
-                    <a16:rowId xmlns:a16="http://schemas.microsoft.com/office/drawing/2014/main" xmlns="" val="3842815335"/>
+                    <a16:rowId xmlns="" xmlns:a16="http://schemas.microsoft.com/office/drawing/2014/main" val="3842815335"/>
                   </a:ext>
                 </a:extLst>
               </a:tr>
@@ -6939,7 +7206,7 @@
                 </a:tc>
                 <a:extLst>
                   <a:ext uri="{0D108BD9-81ED-4DB2-BD59-A6C34878D82A}">
-                    <a16:rowId xmlns:a16="http://schemas.microsoft.com/office/drawing/2014/main" xmlns="" val="321066646"/>
+                    <a16:rowId xmlns="" xmlns:a16="http://schemas.microsoft.com/office/drawing/2014/main" val="321066646"/>
                   </a:ext>
                 </a:extLst>
               </a:tr>
@@ -7010,7 +7277,7 @@
                 </a:tc>
                 <a:extLst>
                   <a:ext uri="{0D108BD9-81ED-4DB2-BD59-A6C34878D82A}">
-                    <a16:rowId xmlns:a16="http://schemas.microsoft.com/office/drawing/2014/main" xmlns="" val="3812060533"/>
+                    <a16:rowId xmlns="" xmlns:a16="http://schemas.microsoft.com/office/drawing/2014/main" val="3812060533"/>
                   </a:ext>
                 </a:extLst>
               </a:tr>
@@ -7390,7 +7657,30 @@
       </p:grpSpPr>
       <p:sp>
         <p:nvSpPr>
-          <p:cNvPr id="7" name="Content Placeholder 6"/>
+          <p:cNvPr id="4" name="Title 3"/>
+          <p:cNvSpPr>
+            <a:spLocks noGrp="1"/>
+          </p:cNvSpPr>
+          <p:nvPr>
+            <p:ph type="title"/>
+          </p:nvPr>
+        </p:nvSpPr>
+        <p:spPr/>
+        <p:txBody>
+          <a:bodyPr/>
+          <a:lstStyle/>
+          <a:p>
+            <a:r>
+              <a:rPr lang="en-US" dirty="0" smtClean="0"/>
+              <a:t>Options for Getting Started</a:t>
+            </a:r>
+            <a:endParaRPr lang="en-US" dirty="0"/>
+          </a:p>
+        </p:txBody>
+      </p:sp>
+      <p:sp>
+        <p:nvSpPr>
+          <p:cNvPr id="5" name="Content Placeholder 4"/>
           <p:cNvSpPr>
             <a:spLocks noGrp="1"/>
           </p:cNvSpPr>
@@ -7400,33 +7690,44 @@
         </p:nvSpPr>
         <p:spPr/>
         <p:txBody>
-          <a:bodyPr>
-            <a:normAutofit/>
-          </a:bodyPr>
-          <a:lstStyle/>
-          <a:p>
-            <a:endParaRPr lang="en-GB" dirty="0"/>
-          </a:p>
-        </p:txBody>
-      </p:sp>
-      <p:sp>
-        <p:nvSpPr>
-          <p:cNvPr id="2" name="Title 1"/>
-          <p:cNvSpPr>
-            <a:spLocks noGrp="1"/>
-          </p:cNvSpPr>
-          <p:nvPr>
-            <p:ph type="title"/>
-          </p:nvPr>
-        </p:nvSpPr>
-        <p:spPr/>
-        <p:txBody>
           <a:bodyPr/>
           <a:lstStyle/>
           <a:p>
             <a:r>
               <a:rPr lang="en-US" dirty="0" smtClean="0"/>
-              <a:t>Resources</a:t>
+              <a:t>angular from scratch</a:t>
+            </a:r>
+          </a:p>
+          <a:p>
+            <a:r>
+              <a:rPr lang="en-US" dirty="0" smtClean="0"/>
+              <a:t>yeoman generator-angular</a:t>
+            </a:r>
+          </a:p>
+          <a:p>
+            <a:r>
+              <a:rPr lang="en-US" dirty="0" smtClean="0"/>
+              <a:t>angular/angular-seed</a:t>
+            </a:r>
+          </a:p>
+          <a:p>
+            <a:r>
+              <a:rPr lang="en-US" dirty="0" smtClean="0"/>
+              <a:t>ng.NET (VS project template)</a:t>
+            </a:r>
+          </a:p>
+          <a:p>
+            <a:r>
+              <a:rPr lang="en-US" dirty="0" smtClean="0"/>
+              <a:t>Hot Towel by John Papa (via </a:t>
+            </a:r>
+            <a:r>
+              <a:rPr lang="en-US" dirty="0" err="1" smtClean="0"/>
+              <a:t>Nuget</a:t>
+            </a:r>
+            <a:r>
+              <a:rPr lang="en-US" dirty="0" smtClean="0"/>
+              <a:t>)</a:t>
             </a:r>
             <a:endParaRPr lang="en-US" dirty="0"/>
           </a:p>
@@ -7435,20 +7736,13 @@
     </p:spTree>
     <p:extLst>
       <p:ext uri="{BB962C8B-B14F-4D97-AF65-F5344CB8AC3E}">
-        <p14:creationId xmlns:p14="http://schemas.microsoft.com/office/powerpoint/2010/main" val="2567384094"/>
+        <p14:creationId xmlns:p14="http://schemas.microsoft.com/office/powerpoint/2010/main" val="1627794042"/>
       </p:ext>
     </p:extLst>
   </p:cSld>
   <p:clrMapOvr>
     <a:masterClrMapping/>
   </p:clrMapOvr>
-  <p:timing>
-    <p:tnLst>
-      <p:par>
-        <p:cTn id="1" dur="indefinite" restart="never" nodeType="tmRoot"/>
-      </p:par>
-    </p:tnLst>
-  </p:timing>
 </p:sld>
 </file>
 
@@ -7471,28 +7765,7 @@
       </p:grpSpPr>
       <p:sp>
         <p:nvSpPr>
-          <p:cNvPr id="7" name="Content Placeholder 6"/>
-          <p:cNvSpPr>
-            <a:spLocks noGrp="1"/>
-          </p:cNvSpPr>
-          <p:nvPr>
-            <p:ph sz="quarter" idx="10"/>
-          </p:nvPr>
-        </p:nvSpPr>
-        <p:spPr/>
-        <p:txBody>
-          <a:bodyPr>
-            <a:normAutofit/>
-          </a:bodyPr>
-          <a:lstStyle/>
-          <a:p>
-            <a:endParaRPr lang="en-GB" dirty="0"/>
-          </a:p>
-        </p:txBody>
-      </p:sp>
-      <p:sp>
-        <p:nvSpPr>
-          <p:cNvPr id="2" name="Title 1"/>
+          <p:cNvPr id="4" name="Title 3"/>
           <p:cNvSpPr>
             <a:spLocks noGrp="1"/>
           </p:cNvSpPr>
@@ -7507,7 +7780,7 @@
           <a:p>
             <a:r>
               <a:rPr lang="en-US" dirty="0" smtClean="0"/>
-              <a:t>Summary</a:t>
+              <a:t>Yeoman generator-angular</a:t>
             </a:r>
             <a:endParaRPr lang="en-US" dirty="0"/>
           </a:p>
@@ -7516,20 +7789,13 @@
     </p:spTree>
     <p:extLst>
       <p:ext uri="{BB962C8B-B14F-4D97-AF65-F5344CB8AC3E}">
-        <p14:creationId xmlns:p14="http://schemas.microsoft.com/office/powerpoint/2010/main" val="393125443"/>
+        <p14:creationId xmlns:p14="http://schemas.microsoft.com/office/powerpoint/2010/main" val="961139186"/>
       </p:ext>
     </p:extLst>
   </p:cSld>
   <p:clrMapOvr>
     <a:masterClrMapping/>
   </p:clrMapOvr>
-  <p:timing>
-    <p:tnLst>
-      <p:par>
-        <p:cTn id="1" dur="indefinite" restart="never" nodeType="tmRoot"/>
-      </p:par>
-    </p:tnLst>
-  </p:timing>
 </p:sld>
 </file>
 
@@ -7550,10 +7816,86 @@
           <a:chExt cx="0" cy="0"/>
         </a:xfrm>
       </p:grpSpPr>
+      <p:sp>
+        <p:nvSpPr>
+          <p:cNvPr id="4" name="Title 3"/>
+          <p:cNvSpPr>
+            <a:spLocks noGrp="1"/>
+          </p:cNvSpPr>
+          <p:nvPr>
+            <p:ph type="title"/>
+          </p:nvPr>
+        </p:nvSpPr>
+        <p:spPr/>
+        <p:txBody>
+          <a:bodyPr/>
+          <a:lstStyle/>
+          <a:p>
+            <a:r>
+              <a:rPr lang="en-US" dirty="0" smtClean="0"/>
+              <a:t>Cloning angular/angular-seed</a:t>
+            </a:r>
+            <a:endParaRPr lang="en-US" dirty="0"/>
+          </a:p>
+        </p:txBody>
+      </p:sp>
     </p:spTree>
     <p:extLst>
       <p:ext uri="{BB962C8B-B14F-4D97-AF65-F5344CB8AC3E}">
-        <p14:creationId xmlns:p14="http://schemas.microsoft.com/office/powerpoint/2010/main" val="898363405"/>
+        <p14:creationId xmlns:p14="http://schemas.microsoft.com/office/powerpoint/2010/main" val="4031838643"/>
+      </p:ext>
+    </p:extLst>
+  </p:cSld>
+  <p:clrMapOvr>
+    <a:masterClrMapping/>
+  </p:clrMapOvr>
+</p:sld>
+</file>
+
+<file path=ppt/slides/slide9.xml><?xml version="1.0" encoding="utf-8"?>
+<p:sld xmlns:a="http://schemas.openxmlformats.org/drawingml/2006/main" xmlns:r="http://schemas.openxmlformats.org/officeDocument/2006/relationships" xmlns:p="http://schemas.openxmlformats.org/presentationml/2006/main">
+  <p:cSld>
+    <p:spTree>
+      <p:nvGrpSpPr>
+        <p:cNvPr id="1" name=""/>
+        <p:cNvGrpSpPr/>
+        <p:nvPr/>
+      </p:nvGrpSpPr>
+      <p:grpSpPr>
+        <a:xfrm>
+          <a:off x="0" y="0"/>
+          <a:ext cx="0" cy="0"/>
+          <a:chOff x="0" y="0"/>
+          <a:chExt cx="0" cy="0"/>
+        </a:xfrm>
+      </p:grpSpPr>
+      <p:sp>
+        <p:nvSpPr>
+          <p:cNvPr id="4" name="Title 3"/>
+          <p:cNvSpPr>
+            <a:spLocks noGrp="1"/>
+          </p:cNvSpPr>
+          <p:nvPr>
+            <p:ph type="title"/>
+          </p:nvPr>
+        </p:nvSpPr>
+        <p:spPr/>
+        <p:txBody>
+          <a:bodyPr/>
+          <a:lstStyle/>
+          <a:p>
+            <a:r>
+              <a:rPr lang="en-US" dirty="0" smtClean="0"/>
+              <a:t>Starting with the ng.NET project template</a:t>
+            </a:r>
+            <a:endParaRPr lang="en-US" dirty="0"/>
+          </a:p>
+        </p:txBody>
+      </p:sp>
+    </p:spTree>
+    <p:extLst>
+      <p:ext uri="{BB962C8B-B14F-4D97-AF65-F5344CB8AC3E}">
+        <p14:creationId xmlns:p14="http://schemas.microsoft.com/office/powerpoint/2010/main" val="2831991818"/>
       </p:ext>
     </p:extLst>
   </p:cSld>
@@ -8656,21 +8998,6 @@
 </file>
 
 <file path=customXml/item1.xml><?xml version="1.0" encoding="utf-8"?>
-<?mso-contentType ?>
-<FormTemplates xmlns="http://schemas.microsoft.com/sharepoint/v3/contenttype/forms">
-  <Display>DocumentLibraryForm</Display>
-  <Edit>DocumentLibraryForm</Edit>
-  <New>DocumentLibraryForm</New>
-</FormTemplates>
-</file>
-
-<file path=customXml/item2.xml><?xml version="1.0" encoding="utf-8"?>
-<p:properties xmlns:p="http://schemas.microsoft.com/office/2006/metadata/properties" xmlns:xsi="http://www.w3.org/2001/XMLSchema-instance" xmlns:pc="http://schemas.microsoft.com/office/infopath/2007/PartnerControls">
-  <documentManagement/>
-</p:properties>
-</file>
-
-<file path=customXml/item3.xml><?xml version="1.0" encoding="utf-8"?>
 <ct:contentTypeSchema xmlns:ct="http://schemas.microsoft.com/office/2006/metadata/contentType" xmlns:ma="http://schemas.microsoft.com/office/2006/metadata/properties/metaAttributes" ct:_="" ma:_="" ma:contentTypeName="Document" ma:contentTypeID="0x010100CF3CFFA86DA93345A891C3CCBC738F63" ma:contentTypeVersion="1" ma:contentTypeDescription="Create a new document." ma:contentTypeScope="" ma:versionID="060e45d69093970729cdde03e78aa3cc">
   <xsd:schema xmlns:xsd="http://www.w3.org/2001/XMLSchema" xmlns:xs="http://www.w3.org/2001/XMLSchema" xmlns:p="http://schemas.microsoft.com/office/2006/metadata/properties" xmlns:ns3="ecd1fa32-ae44-48d6-80a1-71a52da60b4a" targetNamespace="http://schemas.microsoft.com/office/2006/metadata/properties" ma:root="true" ma:fieldsID="2fc9741b54117334ed0e10932dac3600" ns3:_="">
     <xsd:import namespace="ecd1fa32-ae44-48d6-80a1-71a52da60b4a"/>
@@ -8810,10 +9137,35 @@
 </ct:contentTypeSchema>
 </file>
 
+<file path=customXml/item2.xml><?xml version="1.0" encoding="utf-8"?>
+<p:properties xmlns:p="http://schemas.microsoft.com/office/2006/metadata/properties" xmlns:xsi="http://www.w3.org/2001/XMLSchema-instance" xmlns:pc="http://schemas.microsoft.com/office/infopath/2007/PartnerControls">
+  <documentManagement/>
+</p:properties>
+</file>
+
+<file path=customXml/item3.xml><?xml version="1.0" encoding="utf-8"?>
+<?mso-contentType ?>
+<FormTemplates xmlns="http://schemas.microsoft.com/sharepoint/v3/contenttype/forms">
+  <Display>DocumentLibraryForm</Display>
+  <Edit>DocumentLibraryForm</Edit>
+  <New>DocumentLibraryForm</New>
+</FormTemplates>
+</file>
+
 <file path=customXml/itemProps1.xml><?xml version="1.0" encoding="utf-8"?>
-<ds:datastoreItem xmlns:ds="http://schemas.openxmlformats.org/officeDocument/2006/customXml" ds:itemID="{B0CA13EC-1D3C-4D6F-8D1C-E8A452CFC79A}">
+<ds:datastoreItem xmlns:ds="http://schemas.openxmlformats.org/officeDocument/2006/customXml" ds:itemID="{A545FFDC-6555-4FAD-8A13-72F96FEB882E}">
   <ds:schemaRefs>
-    <ds:schemaRef ds:uri="http://schemas.microsoft.com/sharepoint/v3/contenttype/forms"/>
+    <ds:schemaRef ds:uri="http://schemas.microsoft.com/office/2006/metadata/contentType"/>
+    <ds:schemaRef ds:uri="http://schemas.microsoft.com/office/2006/metadata/properties/metaAttributes"/>
+    <ds:schemaRef ds:uri="http://www.w3.org/2001/XMLSchema"/>
+    <ds:schemaRef ds:uri="http://schemas.microsoft.com/office/2006/metadata/properties"/>
+    <ds:schemaRef ds:uri="ecd1fa32-ae44-48d6-80a1-71a52da60b4a"/>
+    <ds:schemaRef ds:uri="http://schemas.microsoft.com/office/2006/documentManagement/types"/>
+    <ds:schemaRef ds:uri="http://schemas.microsoft.com/office/infopath/2007/PartnerControls"/>
+    <ds:schemaRef ds:uri="http://schemas.openxmlformats.org/package/2006/metadata/core-properties"/>
+    <ds:schemaRef ds:uri="http://purl.org/dc/elements/1.1/"/>
+    <ds:schemaRef ds:uri="http://purl.org/dc/terms/"/>
+    <ds:schemaRef ds:uri="http://schemas.microsoft.com/internal/obd"/>
   </ds:schemaRefs>
 </ds:datastoreItem>
 </file>
@@ -8835,19 +9187,9 @@
 </file>
 
 <file path=customXml/itemProps3.xml><?xml version="1.0" encoding="utf-8"?>
-<ds:datastoreItem xmlns:ds="http://schemas.openxmlformats.org/officeDocument/2006/customXml" ds:itemID="{A545FFDC-6555-4FAD-8A13-72F96FEB882E}">
+<ds:datastoreItem xmlns:ds="http://schemas.openxmlformats.org/officeDocument/2006/customXml" ds:itemID="{B0CA13EC-1D3C-4D6F-8D1C-E8A452CFC79A}">
   <ds:schemaRefs>
-    <ds:schemaRef ds:uri="http://schemas.microsoft.com/office/2006/metadata/contentType"/>
-    <ds:schemaRef ds:uri="http://schemas.microsoft.com/office/2006/metadata/properties/metaAttributes"/>
-    <ds:schemaRef ds:uri="http://www.w3.org/2001/XMLSchema"/>
-    <ds:schemaRef ds:uri="http://schemas.microsoft.com/office/2006/metadata/properties"/>
-    <ds:schemaRef ds:uri="ecd1fa32-ae44-48d6-80a1-71a52da60b4a"/>
-    <ds:schemaRef ds:uri="http://schemas.microsoft.com/office/2006/documentManagement/types"/>
-    <ds:schemaRef ds:uri="http://schemas.microsoft.com/office/infopath/2007/PartnerControls"/>
-    <ds:schemaRef ds:uri="http://schemas.openxmlformats.org/package/2006/metadata/core-properties"/>
-    <ds:schemaRef ds:uri="http://purl.org/dc/elements/1.1/"/>
-    <ds:schemaRef ds:uri="http://purl.org/dc/terms/"/>
-    <ds:schemaRef ds:uri="http://schemas.microsoft.com/internal/obd"/>
+    <ds:schemaRef ds:uri="http://schemas.microsoft.com/sharepoint/v3/contenttype/forms"/>
   </ds:schemaRefs>
 </ds:datastoreItem>
 </file>
</xml_diff>